<commit_message>
Update Research Paper and Oral Presentation
</commit_message>
<xml_diff>
--- a/COLABS_Oral_Presentation_C4TL1205_LANDY-Lucas.pptx
+++ b/COLABS_Oral_Presentation_C4TL1205_LANDY-Lucas.pptx
@@ -104,7 +104,492 @@
       </a:defRPr>
     </a:lvl9pPr>
   </p:defaultTextStyle>
+  <p:extLst>
+    <p:ext uri="{EFAFB233-063F-42B5-8137-9DF3F51BA10A}">
+      <p15:sldGuideLst xmlns:p15="http://schemas.microsoft.com/office/powerpoint/2012/main"/>
+    </p:ext>
+  </p:extLst>
 </p:presentation>
+</file>
+
+<file path=ppt/changesInfos/changesInfo1.xml><?xml version="1.0" encoding="utf-8"?>
+<pc:chgInfo xmlns:a="http://schemas.openxmlformats.org/drawingml/2006/main" xmlns:r="http://schemas.openxmlformats.org/officeDocument/2006/relationships" xmlns:ac="http://schemas.microsoft.com/office/drawing/2013/main/command" xmlns:pc="http://schemas.microsoft.com/office/powerpoint/2013/main/command">
+  <pc:docChgLst>
+    <pc:chgData name="Lucas Landy" userId="a13a8088-e36b-49a3-87c4-124f1390f1ca" providerId="ADAL" clId="{7E56CF49-B0B9-A144-8BC8-BD35ED3E29BD}"/>
+    <pc:docChg chg="undo custSel addSld delSld modSld modMainMaster">
+      <pc:chgData name="Lucas Landy" userId="a13a8088-e36b-49a3-87c4-124f1390f1ca" providerId="ADAL" clId="{7E56CF49-B0B9-A144-8BC8-BD35ED3E29BD}" dt="2025-01-05T02:10:48.544" v="164" actId="2696"/>
+      <pc:docMkLst>
+        <pc:docMk/>
+      </pc:docMkLst>
+      <pc:sldChg chg="addSp delSp modSp mod modTransition setBg">
+        <pc:chgData name="Lucas Landy" userId="a13a8088-e36b-49a3-87c4-124f1390f1ca" providerId="ADAL" clId="{7E56CF49-B0B9-A144-8BC8-BD35ED3E29BD}" dt="2025-01-05T02:10:17.977" v="163" actId="207"/>
+        <pc:sldMkLst>
+          <pc:docMk/>
+          <pc:sldMk cId="2143034702" sldId="256"/>
+        </pc:sldMkLst>
+        <pc:spChg chg="mod">
+          <ac:chgData name="Lucas Landy" userId="a13a8088-e36b-49a3-87c4-124f1390f1ca" providerId="ADAL" clId="{7E56CF49-B0B9-A144-8BC8-BD35ED3E29BD}" dt="2025-01-05T02:10:17.977" v="163" actId="207"/>
+          <ac:spMkLst>
+            <pc:docMk/>
+            <pc:sldMk cId="2143034702" sldId="256"/>
+            <ac:spMk id="2" creationId="{74DEE68C-16F7-FC39-BD57-0ACDE6A6784B}"/>
+          </ac:spMkLst>
+        </pc:spChg>
+        <pc:spChg chg="del mod">
+          <ac:chgData name="Lucas Landy" userId="a13a8088-e36b-49a3-87c4-124f1390f1ca" providerId="ADAL" clId="{7E56CF49-B0B9-A144-8BC8-BD35ED3E29BD}" dt="2025-01-05T02:05:21.191" v="112" actId="478"/>
+          <ac:spMkLst>
+            <pc:docMk/>
+            <pc:sldMk cId="2143034702" sldId="256"/>
+            <ac:spMk id="3" creationId="{BE180B9B-8F46-76FE-8971-06A4968BE049}"/>
+          </ac:spMkLst>
+        </pc:spChg>
+        <pc:spChg chg="add">
+          <ac:chgData name="Lucas Landy" userId="a13a8088-e36b-49a3-87c4-124f1390f1ca" providerId="ADAL" clId="{7E56CF49-B0B9-A144-8BC8-BD35ED3E29BD}" dt="2025-01-05T02:01:41.057" v="78" actId="26606"/>
+          <ac:spMkLst>
+            <pc:docMk/>
+            <pc:sldMk cId="2143034702" sldId="256"/>
+            <ac:spMk id="19" creationId="{932495F0-C5CB-4823-AE70-EED61EBAB1BD}"/>
+          </ac:spMkLst>
+        </pc:spChg>
+        <pc:spChg chg="add">
+          <ac:chgData name="Lucas Landy" userId="a13a8088-e36b-49a3-87c4-124f1390f1ca" providerId="ADAL" clId="{7E56CF49-B0B9-A144-8BC8-BD35ED3E29BD}" dt="2025-01-05T02:01:41.057" v="78" actId="26606"/>
+          <ac:spMkLst>
+            <pc:docMk/>
+            <pc:sldMk cId="2143034702" sldId="256"/>
+            <ac:spMk id="21" creationId="{CB8B9C25-D80D-48EC-B83A-231219A80C3F}"/>
+          </ac:spMkLst>
+        </pc:spChg>
+        <pc:spChg chg="add">
+          <ac:chgData name="Lucas Landy" userId="a13a8088-e36b-49a3-87c4-124f1390f1ca" providerId="ADAL" clId="{7E56CF49-B0B9-A144-8BC8-BD35ED3E29BD}" dt="2025-01-05T02:01:41.057" v="78" actId="26606"/>
+          <ac:spMkLst>
+            <pc:docMk/>
+            <pc:sldMk cId="2143034702" sldId="256"/>
+            <ac:spMk id="23" creationId="{601CC70B-8875-45A1-8AFD-7D546E3C0C16}"/>
+          </ac:spMkLst>
+        </pc:spChg>
+        <pc:picChg chg="add del mod">
+          <ac:chgData name="Lucas Landy" userId="a13a8088-e36b-49a3-87c4-124f1390f1ca" providerId="ADAL" clId="{7E56CF49-B0B9-A144-8BC8-BD35ED3E29BD}" dt="2025-01-05T02:00:32.429" v="73" actId="478"/>
+          <ac:picMkLst>
+            <pc:docMk/>
+            <pc:sldMk cId="2143034702" sldId="256"/>
+            <ac:picMk id="6" creationId="{72318F0D-4FA9-4AEA-03B7-174C87CF41D5}"/>
+          </ac:picMkLst>
+        </pc:picChg>
+        <pc:picChg chg="add mod">
+          <ac:chgData name="Lucas Landy" userId="a13a8088-e36b-49a3-87c4-124f1390f1ca" providerId="ADAL" clId="{7E56CF49-B0B9-A144-8BC8-BD35ED3E29BD}" dt="2025-01-05T02:07:18.542" v="127" actId="1076"/>
+          <ac:picMkLst>
+            <pc:docMk/>
+            <pc:sldMk cId="2143034702" sldId="256"/>
+            <ac:picMk id="9" creationId="{ADC8AD5B-F637-A865-9ECA-B63CAB8B899D}"/>
+          </ac:picMkLst>
+        </pc:picChg>
+        <pc:picChg chg="add del">
+          <ac:chgData name="Lucas Landy" userId="a13a8088-e36b-49a3-87c4-124f1390f1ca" providerId="ADAL" clId="{7E56CF49-B0B9-A144-8BC8-BD35ED3E29BD}" dt="2025-01-05T02:00:29.089" v="72" actId="478"/>
+          <ac:picMkLst>
+            <pc:docMk/>
+            <pc:sldMk cId="2143034702" sldId="256"/>
+            <ac:picMk id="11" creationId="{F9D3A21F-7F23-5292-DCC2-AE90CD2E5306}"/>
+          </ac:picMkLst>
+        </pc:picChg>
+        <pc:picChg chg="add mod">
+          <ac:chgData name="Lucas Landy" userId="a13a8088-e36b-49a3-87c4-124f1390f1ca" providerId="ADAL" clId="{7E56CF49-B0B9-A144-8BC8-BD35ED3E29BD}" dt="2025-01-05T02:07:12.025" v="124" actId="1076"/>
+          <ac:picMkLst>
+            <pc:docMk/>
+            <pc:sldMk cId="2143034702" sldId="256"/>
+            <ac:picMk id="14" creationId="{8D2C3CEB-0A06-52BC-40B9-0BAD517DFEE1}"/>
+          </ac:picMkLst>
+        </pc:picChg>
+        <pc:picChg chg="add del">
+          <ac:chgData name="Lucas Landy" userId="a13a8088-e36b-49a3-87c4-124f1390f1ca" providerId="ADAL" clId="{7E56CF49-B0B9-A144-8BC8-BD35ED3E29BD}" dt="2025-01-05T02:02:57.635" v="87" actId="478"/>
+          <ac:picMkLst>
+            <pc:docMk/>
+            <pc:sldMk cId="2143034702" sldId="256"/>
+            <ac:picMk id="17" creationId="{7813D80E-51C7-5F2D-B38E-FC9E2E5762E3}"/>
+          </ac:picMkLst>
+        </pc:picChg>
+        <pc:picChg chg="add mod">
+          <ac:chgData name="Lucas Landy" userId="a13a8088-e36b-49a3-87c4-124f1390f1ca" providerId="ADAL" clId="{7E56CF49-B0B9-A144-8BC8-BD35ED3E29BD}" dt="2025-01-05T02:06:50.640" v="117" actId="1076"/>
+          <ac:picMkLst>
+            <pc:docMk/>
+            <pc:sldMk cId="2143034702" sldId="256"/>
+            <ac:picMk id="18" creationId="{3FD2F824-8E09-5EEA-F048-03075A56558A}"/>
+          </ac:picMkLst>
+        </pc:picChg>
+      </pc:sldChg>
+      <pc:sldChg chg="new del modTransition">
+        <pc:chgData name="Lucas Landy" userId="a13a8088-e36b-49a3-87c4-124f1390f1ca" providerId="ADAL" clId="{7E56CF49-B0B9-A144-8BC8-BD35ED3E29BD}" dt="2025-01-05T02:02:45.836" v="85" actId="2696"/>
+        <pc:sldMkLst>
+          <pc:docMk/>
+          <pc:sldMk cId="1268454245" sldId="257"/>
+        </pc:sldMkLst>
+      </pc:sldChg>
+      <pc:sldChg chg="addSp delSp modSp add del">
+        <pc:chgData name="Lucas Landy" userId="a13a8088-e36b-49a3-87c4-124f1390f1ca" providerId="ADAL" clId="{7E56CF49-B0B9-A144-8BC8-BD35ED3E29BD}" dt="2025-01-05T02:10:48.544" v="164" actId="2696"/>
+        <pc:sldMkLst>
+          <pc:docMk/>
+          <pc:sldMk cId="3199168977" sldId="257"/>
+        </pc:sldMkLst>
+        <pc:spChg chg="mod">
+          <ac:chgData name="Lucas Landy" userId="a13a8088-e36b-49a3-87c4-124f1390f1ca" providerId="ADAL" clId="{7E56CF49-B0B9-A144-8BC8-BD35ED3E29BD}" dt="2025-01-05T02:03:47.913" v="102" actId="26606"/>
+          <ac:spMkLst>
+            <pc:docMk/>
+            <pc:sldMk cId="3199168977" sldId="257"/>
+            <ac:spMk id="2" creationId="{74DEE68C-16F7-FC39-BD57-0ACDE6A6784B}"/>
+          </ac:spMkLst>
+        </pc:spChg>
+        <pc:spChg chg="mod">
+          <ac:chgData name="Lucas Landy" userId="a13a8088-e36b-49a3-87c4-124f1390f1ca" providerId="ADAL" clId="{7E56CF49-B0B9-A144-8BC8-BD35ED3E29BD}" dt="2025-01-05T02:03:47.899" v="101" actId="26606"/>
+          <ac:spMkLst>
+            <pc:docMk/>
+            <pc:sldMk cId="3199168977" sldId="257"/>
+            <ac:spMk id="3" creationId="{BE180B9B-8F46-76FE-8971-06A4968BE049}"/>
+          </ac:spMkLst>
+        </pc:spChg>
+        <pc:spChg chg="add del">
+          <ac:chgData name="Lucas Landy" userId="a13a8088-e36b-49a3-87c4-124f1390f1ca" providerId="ADAL" clId="{7E56CF49-B0B9-A144-8BC8-BD35ED3E29BD}" dt="2025-01-05T02:03:42.945" v="91" actId="26606"/>
+          <ac:spMkLst>
+            <pc:docMk/>
+            <pc:sldMk cId="3199168977" sldId="257"/>
+            <ac:spMk id="19" creationId="{932495F0-C5CB-4823-AE70-EED61EBAB1BD}"/>
+          </ac:spMkLst>
+        </pc:spChg>
+        <pc:spChg chg="add del">
+          <ac:chgData name="Lucas Landy" userId="a13a8088-e36b-49a3-87c4-124f1390f1ca" providerId="ADAL" clId="{7E56CF49-B0B9-A144-8BC8-BD35ED3E29BD}" dt="2025-01-05T02:03:42.945" v="91" actId="26606"/>
+          <ac:spMkLst>
+            <pc:docMk/>
+            <pc:sldMk cId="3199168977" sldId="257"/>
+            <ac:spMk id="21" creationId="{CB8B9C25-D80D-48EC-B83A-231219A80C3F}"/>
+          </ac:spMkLst>
+        </pc:spChg>
+        <pc:spChg chg="add del">
+          <ac:chgData name="Lucas Landy" userId="a13a8088-e36b-49a3-87c4-124f1390f1ca" providerId="ADAL" clId="{7E56CF49-B0B9-A144-8BC8-BD35ED3E29BD}" dt="2025-01-05T02:03:42.945" v="91" actId="26606"/>
+          <ac:spMkLst>
+            <pc:docMk/>
+            <pc:sldMk cId="3199168977" sldId="257"/>
+            <ac:spMk id="23" creationId="{601CC70B-8875-45A1-8AFD-7D546E3C0C16}"/>
+          </ac:spMkLst>
+        </pc:spChg>
+        <pc:spChg chg="add del">
+          <ac:chgData name="Lucas Landy" userId="a13a8088-e36b-49a3-87c4-124f1390f1ca" providerId="ADAL" clId="{7E56CF49-B0B9-A144-8BC8-BD35ED3E29BD}" dt="2025-01-05T02:03:43.711" v="93" actId="26606"/>
+          <ac:spMkLst>
+            <pc:docMk/>
+            <pc:sldMk cId="3199168977" sldId="257"/>
+            <ac:spMk id="25" creationId="{AF2F604E-43BE-4DC3-B983-E071523364F8}"/>
+          </ac:spMkLst>
+        </pc:spChg>
+        <pc:spChg chg="add del">
+          <ac:chgData name="Lucas Landy" userId="a13a8088-e36b-49a3-87c4-124f1390f1ca" providerId="ADAL" clId="{7E56CF49-B0B9-A144-8BC8-BD35ED3E29BD}" dt="2025-01-05T02:03:43.711" v="93" actId="26606"/>
+          <ac:spMkLst>
+            <pc:docMk/>
+            <pc:sldMk cId="3199168977" sldId="257"/>
+            <ac:spMk id="26" creationId="{FB33DC6A-1F1C-4A06-834E-CFF88F1C0BB9}"/>
+          </ac:spMkLst>
+        </pc:spChg>
+        <pc:spChg chg="add del">
+          <ac:chgData name="Lucas Landy" userId="a13a8088-e36b-49a3-87c4-124f1390f1ca" providerId="ADAL" clId="{7E56CF49-B0B9-A144-8BC8-BD35ED3E29BD}" dt="2025-01-05T02:03:43.711" v="93" actId="26606"/>
+          <ac:spMkLst>
+            <pc:docMk/>
+            <pc:sldMk cId="3199168977" sldId="257"/>
+            <ac:spMk id="27" creationId="{08C9B587-E65E-4B52-B37C-ABEBB6E87928}"/>
+          </ac:spMkLst>
+        </pc:spChg>
+        <pc:spChg chg="add del">
+          <ac:chgData name="Lucas Landy" userId="a13a8088-e36b-49a3-87c4-124f1390f1ca" providerId="ADAL" clId="{7E56CF49-B0B9-A144-8BC8-BD35ED3E29BD}" dt="2025-01-05T02:03:43.711" v="93" actId="26606"/>
+          <ac:spMkLst>
+            <pc:docMk/>
+            <pc:sldMk cId="3199168977" sldId="257"/>
+            <ac:spMk id="28" creationId="{0FE1D5CF-87B8-4A8A-AD3C-01D06A60769B}"/>
+          </ac:spMkLst>
+        </pc:spChg>
+        <pc:spChg chg="add del">
+          <ac:chgData name="Lucas Landy" userId="a13a8088-e36b-49a3-87c4-124f1390f1ca" providerId="ADAL" clId="{7E56CF49-B0B9-A144-8BC8-BD35ED3E29BD}" dt="2025-01-05T02:03:43.711" v="93" actId="26606"/>
+          <ac:spMkLst>
+            <pc:docMk/>
+            <pc:sldMk cId="3199168977" sldId="257"/>
+            <ac:spMk id="29" creationId="{60926200-45C2-41E9-839F-31CD5FE4CD59}"/>
+          </ac:spMkLst>
+        </pc:spChg>
+        <pc:spChg chg="add del">
+          <ac:chgData name="Lucas Landy" userId="a13a8088-e36b-49a3-87c4-124f1390f1ca" providerId="ADAL" clId="{7E56CF49-B0B9-A144-8BC8-BD35ED3E29BD}" dt="2025-01-05T02:03:44.483" v="95" actId="26606"/>
+          <ac:spMkLst>
+            <pc:docMk/>
+            <pc:sldMk cId="3199168977" sldId="257"/>
+            <ac:spMk id="31" creationId="{932495F0-C5CB-4823-AE70-EED61EBAB1BD}"/>
+          </ac:spMkLst>
+        </pc:spChg>
+        <pc:spChg chg="add del">
+          <ac:chgData name="Lucas Landy" userId="a13a8088-e36b-49a3-87c4-124f1390f1ca" providerId="ADAL" clId="{7E56CF49-B0B9-A144-8BC8-BD35ED3E29BD}" dt="2025-01-05T02:03:44.483" v="95" actId="26606"/>
+          <ac:spMkLst>
+            <pc:docMk/>
+            <pc:sldMk cId="3199168977" sldId="257"/>
+            <ac:spMk id="32" creationId="{CB8B9C25-D80D-48EC-B83A-231219A80C3F}"/>
+          </ac:spMkLst>
+        </pc:spChg>
+        <pc:spChg chg="add del">
+          <ac:chgData name="Lucas Landy" userId="a13a8088-e36b-49a3-87c4-124f1390f1ca" providerId="ADAL" clId="{7E56CF49-B0B9-A144-8BC8-BD35ED3E29BD}" dt="2025-01-05T02:03:44.483" v="95" actId="26606"/>
+          <ac:spMkLst>
+            <pc:docMk/>
+            <pc:sldMk cId="3199168977" sldId="257"/>
+            <ac:spMk id="33" creationId="{601CC70B-8875-45A1-8AFD-7D546E3C0C16}"/>
+          </ac:spMkLst>
+        </pc:spChg>
+        <pc:spChg chg="add del">
+          <ac:chgData name="Lucas Landy" userId="a13a8088-e36b-49a3-87c4-124f1390f1ca" providerId="ADAL" clId="{7E56CF49-B0B9-A144-8BC8-BD35ED3E29BD}" dt="2025-01-05T02:03:46.596" v="97" actId="26606"/>
+          <ac:spMkLst>
+            <pc:docMk/>
+            <pc:sldMk cId="3199168977" sldId="257"/>
+            <ac:spMk id="35" creationId="{FB33DC6A-1F1C-4A06-834E-CFF88F1C0BB9}"/>
+          </ac:spMkLst>
+        </pc:spChg>
+        <pc:spChg chg="add del">
+          <ac:chgData name="Lucas Landy" userId="a13a8088-e36b-49a3-87c4-124f1390f1ca" providerId="ADAL" clId="{7E56CF49-B0B9-A144-8BC8-BD35ED3E29BD}" dt="2025-01-05T02:03:46.596" v="97" actId="26606"/>
+          <ac:spMkLst>
+            <pc:docMk/>
+            <pc:sldMk cId="3199168977" sldId="257"/>
+            <ac:spMk id="36" creationId="{0FE1D5CF-87B8-4A8A-AD3C-01D06A60769B}"/>
+          </ac:spMkLst>
+        </pc:spChg>
+        <pc:spChg chg="add del">
+          <ac:chgData name="Lucas Landy" userId="a13a8088-e36b-49a3-87c4-124f1390f1ca" providerId="ADAL" clId="{7E56CF49-B0B9-A144-8BC8-BD35ED3E29BD}" dt="2025-01-05T02:03:46.596" v="97" actId="26606"/>
+          <ac:spMkLst>
+            <pc:docMk/>
+            <pc:sldMk cId="3199168977" sldId="257"/>
+            <ac:spMk id="37" creationId="{60926200-45C2-41E9-839F-31CD5FE4CD59}"/>
+          </ac:spMkLst>
+        </pc:spChg>
+        <pc:spChg chg="add del">
+          <ac:chgData name="Lucas Landy" userId="a13a8088-e36b-49a3-87c4-124f1390f1ca" providerId="ADAL" clId="{7E56CF49-B0B9-A144-8BC8-BD35ED3E29BD}" dt="2025-01-05T02:03:46.596" v="97" actId="26606"/>
+          <ac:spMkLst>
+            <pc:docMk/>
+            <pc:sldMk cId="3199168977" sldId="257"/>
+            <ac:spMk id="38" creationId="{AF2F604E-43BE-4DC3-B983-E071523364F8}"/>
+          </ac:spMkLst>
+        </pc:spChg>
+        <pc:spChg chg="add del">
+          <ac:chgData name="Lucas Landy" userId="a13a8088-e36b-49a3-87c4-124f1390f1ca" providerId="ADAL" clId="{7E56CF49-B0B9-A144-8BC8-BD35ED3E29BD}" dt="2025-01-05T02:03:46.596" v="97" actId="26606"/>
+          <ac:spMkLst>
+            <pc:docMk/>
+            <pc:sldMk cId="3199168977" sldId="257"/>
+            <ac:spMk id="39" creationId="{08C9B587-E65E-4B52-B37C-ABEBB6E87928}"/>
+          </ac:spMkLst>
+        </pc:spChg>
+        <pc:spChg chg="add del">
+          <ac:chgData name="Lucas Landy" userId="a13a8088-e36b-49a3-87c4-124f1390f1ca" providerId="ADAL" clId="{7E56CF49-B0B9-A144-8BC8-BD35ED3E29BD}" dt="2025-01-05T02:03:47.157" v="99" actId="26606"/>
+          <ac:spMkLst>
+            <pc:docMk/>
+            <pc:sldMk cId="3199168977" sldId="257"/>
+            <ac:spMk id="41" creationId="{932495F0-C5CB-4823-AE70-EED61EBAB1BD}"/>
+          </ac:spMkLst>
+        </pc:spChg>
+        <pc:spChg chg="add del">
+          <ac:chgData name="Lucas Landy" userId="a13a8088-e36b-49a3-87c4-124f1390f1ca" providerId="ADAL" clId="{7E56CF49-B0B9-A144-8BC8-BD35ED3E29BD}" dt="2025-01-05T02:03:47.157" v="99" actId="26606"/>
+          <ac:spMkLst>
+            <pc:docMk/>
+            <pc:sldMk cId="3199168977" sldId="257"/>
+            <ac:spMk id="42" creationId="{CB8B9C25-D80D-48EC-B83A-231219A80C3F}"/>
+          </ac:spMkLst>
+        </pc:spChg>
+        <pc:spChg chg="add del">
+          <ac:chgData name="Lucas Landy" userId="a13a8088-e36b-49a3-87c4-124f1390f1ca" providerId="ADAL" clId="{7E56CF49-B0B9-A144-8BC8-BD35ED3E29BD}" dt="2025-01-05T02:03:47.157" v="99" actId="26606"/>
+          <ac:spMkLst>
+            <pc:docMk/>
+            <pc:sldMk cId="3199168977" sldId="257"/>
+            <ac:spMk id="43" creationId="{601CC70B-8875-45A1-8AFD-7D546E3C0C16}"/>
+          </ac:spMkLst>
+        </pc:spChg>
+        <pc:spChg chg="add del">
+          <ac:chgData name="Lucas Landy" userId="a13a8088-e36b-49a3-87c4-124f1390f1ca" providerId="ADAL" clId="{7E56CF49-B0B9-A144-8BC8-BD35ED3E29BD}" dt="2025-01-05T02:03:47.899" v="101" actId="26606"/>
+          <ac:spMkLst>
+            <pc:docMk/>
+            <pc:sldMk cId="3199168977" sldId="257"/>
+            <ac:spMk id="45" creationId="{FB33DC6A-1F1C-4A06-834E-CFF88F1C0BB9}"/>
+          </ac:spMkLst>
+        </pc:spChg>
+        <pc:spChg chg="add del">
+          <ac:chgData name="Lucas Landy" userId="a13a8088-e36b-49a3-87c4-124f1390f1ca" providerId="ADAL" clId="{7E56CF49-B0B9-A144-8BC8-BD35ED3E29BD}" dt="2025-01-05T02:03:47.899" v="101" actId="26606"/>
+          <ac:spMkLst>
+            <pc:docMk/>
+            <pc:sldMk cId="3199168977" sldId="257"/>
+            <ac:spMk id="46" creationId="{0FE1D5CF-87B8-4A8A-AD3C-01D06A60769B}"/>
+          </ac:spMkLst>
+        </pc:spChg>
+        <pc:spChg chg="add del">
+          <ac:chgData name="Lucas Landy" userId="a13a8088-e36b-49a3-87c4-124f1390f1ca" providerId="ADAL" clId="{7E56CF49-B0B9-A144-8BC8-BD35ED3E29BD}" dt="2025-01-05T02:03:47.899" v="101" actId="26606"/>
+          <ac:spMkLst>
+            <pc:docMk/>
+            <pc:sldMk cId="3199168977" sldId="257"/>
+            <ac:spMk id="47" creationId="{60926200-45C2-41E9-839F-31CD5FE4CD59}"/>
+          </ac:spMkLst>
+        </pc:spChg>
+        <pc:spChg chg="add del">
+          <ac:chgData name="Lucas Landy" userId="a13a8088-e36b-49a3-87c4-124f1390f1ca" providerId="ADAL" clId="{7E56CF49-B0B9-A144-8BC8-BD35ED3E29BD}" dt="2025-01-05T02:03:47.899" v="101" actId="26606"/>
+          <ac:spMkLst>
+            <pc:docMk/>
+            <pc:sldMk cId="3199168977" sldId="257"/>
+            <ac:spMk id="48" creationId="{AF2F604E-43BE-4DC3-B983-E071523364F8}"/>
+          </ac:spMkLst>
+        </pc:spChg>
+        <pc:spChg chg="add del">
+          <ac:chgData name="Lucas Landy" userId="a13a8088-e36b-49a3-87c4-124f1390f1ca" providerId="ADAL" clId="{7E56CF49-B0B9-A144-8BC8-BD35ED3E29BD}" dt="2025-01-05T02:03:47.899" v="101" actId="26606"/>
+          <ac:spMkLst>
+            <pc:docMk/>
+            <pc:sldMk cId="3199168977" sldId="257"/>
+            <ac:spMk id="49" creationId="{08C9B587-E65E-4B52-B37C-ABEBB6E87928}"/>
+          </ac:spMkLst>
+        </pc:spChg>
+        <pc:spChg chg="add">
+          <ac:chgData name="Lucas Landy" userId="a13a8088-e36b-49a3-87c4-124f1390f1ca" providerId="ADAL" clId="{7E56CF49-B0B9-A144-8BC8-BD35ED3E29BD}" dt="2025-01-05T02:03:47.913" v="102" actId="26606"/>
+          <ac:spMkLst>
+            <pc:docMk/>
+            <pc:sldMk cId="3199168977" sldId="257"/>
+            <ac:spMk id="51" creationId="{932495F0-C5CB-4823-AE70-EED61EBAB1BD}"/>
+          </ac:spMkLst>
+        </pc:spChg>
+        <pc:spChg chg="add">
+          <ac:chgData name="Lucas Landy" userId="a13a8088-e36b-49a3-87c4-124f1390f1ca" providerId="ADAL" clId="{7E56CF49-B0B9-A144-8BC8-BD35ED3E29BD}" dt="2025-01-05T02:03:47.913" v="102" actId="26606"/>
+          <ac:spMkLst>
+            <pc:docMk/>
+            <pc:sldMk cId="3199168977" sldId="257"/>
+            <ac:spMk id="52" creationId="{CB8B9C25-D80D-48EC-B83A-231219A80C3F}"/>
+          </ac:spMkLst>
+        </pc:spChg>
+        <pc:spChg chg="add">
+          <ac:chgData name="Lucas Landy" userId="a13a8088-e36b-49a3-87c4-124f1390f1ca" providerId="ADAL" clId="{7E56CF49-B0B9-A144-8BC8-BD35ED3E29BD}" dt="2025-01-05T02:03:47.913" v="102" actId="26606"/>
+          <ac:spMkLst>
+            <pc:docMk/>
+            <pc:sldMk cId="3199168977" sldId="257"/>
+            <ac:spMk id="53" creationId="{601CC70B-8875-45A1-8AFD-7D546E3C0C16}"/>
+          </ac:spMkLst>
+        </pc:spChg>
+        <pc:picChg chg="mod ord">
+          <ac:chgData name="Lucas Landy" userId="a13a8088-e36b-49a3-87c4-124f1390f1ca" providerId="ADAL" clId="{7E56CF49-B0B9-A144-8BC8-BD35ED3E29BD}" dt="2025-01-05T02:03:47.913" v="102" actId="26606"/>
+          <ac:picMkLst>
+            <pc:docMk/>
+            <pc:sldMk cId="3199168977" sldId="257"/>
+            <ac:picMk id="9" creationId="{ADC8AD5B-F637-A865-9ECA-B63CAB8B899D}"/>
+          </ac:picMkLst>
+        </pc:picChg>
+        <pc:picChg chg="mod">
+          <ac:chgData name="Lucas Landy" userId="a13a8088-e36b-49a3-87c4-124f1390f1ca" providerId="ADAL" clId="{7E56CF49-B0B9-A144-8BC8-BD35ED3E29BD}" dt="2025-01-05T02:03:47.899" v="101" actId="26606"/>
+          <ac:picMkLst>
+            <pc:docMk/>
+            <pc:sldMk cId="3199168977" sldId="257"/>
+            <ac:picMk id="14" creationId="{8D2C3CEB-0A06-52BC-40B9-0BAD517DFEE1}"/>
+          </ac:picMkLst>
+        </pc:picChg>
+      </pc:sldChg>
+      <pc:sldChg chg="new del">
+        <pc:chgData name="Lucas Landy" userId="a13a8088-e36b-49a3-87c4-124f1390f1ca" providerId="ADAL" clId="{7E56CF49-B0B9-A144-8BC8-BD35ED3E29BD}" dt="2025-01-05T02:02:41.006" v="84" actId="2696"/>
+        <pc:sldMkLst>
+          <pc:docMk/>
+          <pc:sldMk cId="1584637239" sldId="258"/>
+        </pc:sldMkLst>
+      </pc:sldChg>
+      <pc:sldChg chg="add del">
+        <pc:chgData name="Lucas Landy" userId="a13a8088-e36b-49a3-87c4-124f1390f1ca" providerId="ADAL" clId="{7E56CF49-B0B9-A144-8BC8-BD35ED3E29BD}" dt="2025-01-05T02:04:25.088" v="104" actId="2696"/>
+        <pc:sldMkLst>
+          <pc:docMk/>
+          <pc:sldMk cId="3292711074" sldId="258"/>
+        </pc:sldMkLst>
+      </pc:sldChg>
+      <pc:sldMasterChg chg="modTransition modSldLayout">
+        <pc:chgData name="Lucas Landy" userId="a13a8088-e36b-49a3-87c4-124f1390f1ca" providerId="ADAL" clId="{7E56CF49-B0B9-A144-8BC8-BD35ED3E29BD}" dt="2025-01-05T02:02:28.825" v="82" actId="12563"/>
+        <pc:sldMasterMkLst>
+          <pc:docMk/>
+          <pc:sldMasterMk cId="2290278778" sldId="2147483648"/>
+        </pc:sldMasterMkLst>
+        <pc:sldLayoutChg chg="modTransition">
+          <pc:chgData name="Lucas Landy" userId="a13a8088-e36b-49a3-87c4-124f1390f1ca" providerId="ADAL" clId="{7E56CF49-B0B9-A144-8BC8-BD35ED3E29BD}" dt="2025-01-05T02:02:28.825" v="82" actId="12563"/>
+          <pc:sldLayoutMkLst>
+            <pc:docMk/>
+            <pc:sldMasterMk cId="2290278778" sldId="2147483648"/>
+            <pc:sldLayoutMk cId="2714234569" sldId="2147483649"/>
+          </pc:sldLayoutMkLst>
+        </pc:sldLayoutChg>
+        <pc:sldLayoutChg chg="modTransition">
+          <pc:chgData name="Lucas Landy" userId="a13a8088-e36b-49a3-87c4-124f1390f1ca" providerId="ADAL" clId="{7E56CF49-B0B9-A144-8BC8-BD35ED3E29BD}" dt="2025-01-05T02:02:28.825" v="82" actId="12563"/>
+          <pc:sldLayoutMkLst>
+            <pc:docMk/>
+            <pc:sldMasterMk cId="2290278778" sldId="2147483648"/>
+            <pc:sldLayoutMk cId="3608500794" sldId="2147483650"/>
+          </pc:sldLayoutMkLst>
+        </pc:sldLayoutChg>
+        <pc:sldLayoutChg chg="modTransition">
+          <pc:chgData name="Lucas Landy" userId="a13a8088-e36b-49a3-87c4-124f1390f1ca" providerId="ADAL" clId="{7E56CF49-B0B9-A144-8BC8-BD35ED3E29BD}" dt="2025-01-05T02:02:28.825" v="82" actId="12563"/>
+          <pc:sldLayoutMkLst>
+            <pc:docMk/>
+            <pc:sldMasterMk cId="2290278778" sldId="2147483648"/>
+            <pc:sldLayoutMk cId="3620798409" sldId="2147483651"/>
+          </pc:sldLayoutMkLst>
+        </pc:sldLayoutChg>
+        <pc:sldLayoutChg chg="modTransition">
+          <pc:chgData name="Lucas Landy" userId="a13a8088-e36b-49a3-87c4-124f1390f1ca" providerId="ADAL" clId="{7E56CF49-B0B9-A144-8BC8-BD35ED3E29BD}" dt="2025-01-05T02:02:28.825" v="82" actId="12563"/>
+          <pc:sldLayoutMkLst>
+            <pc:docMk/>
+            <pc:sldMasterMk cId="2290278778" sldId="2147483648"/>
+            <pc:sldLayoutMk cId="533047118" sldId="2147483652"/>
+          </pc:sldLayoutMkLst>
+        </pc:sldLayoutChg>
+        <pc:sldLayoutChg chg="modTransition">
+          <pc:chgData name="Lucas Landy" userId="a13a8088-e36b-49a3-87c4-124f1390f1ca" providerId="ADAL" clId="{7E56CF49-B0B9-A144-8BC8-BD35ED3E29BD}" dt="2025-01-05T02:02:28.825" v="82" actId="12563"/>
+          <pc:sldLayoutMkLst>
+            <pc:docMk/>
+            <pc:sldMasterMk cId="2290278778" sldId="2147483648"/>
+            <pc:sldLayoutMk cId="127424374" sldId="2147483653"/>
+          </pc:sldLayoutMkLst>
+        </pc:sldLayoutChg>
+        <pc:sldLayoutChg chg="modTransition">
+          <pc:chgData name="Lucas Landy" userId="a13a8088-e36b-49a3-87c4-124f1390f1ca" providerId="ADAL" clId="{7E56CF49-B0B9-A144-8BC8-BD35ED3E29BD}" dt="2025-01-05T02:02:28.825" v="82" actId="12563"/>
+          <pc:sldLayoutMkLst>
+            <pc:docMk/>
+            <pc:sldMasterMk cId="2290278778" sldId="2147483648"/>
+            <pc:sldLayoutMk cId="1529382347" sldId="2147483654"/>
+          </pc:sldLayoutMkLst>
+        </pc:sldLayoutChg>
+        <pc:sldLayoutChg chg="modTransition">
+          <pc:chgData name="Lucas Landy" userId="a13a8088-e36b-49a3-87c4-124f1390f1ca" providerId="ADAL" clId="{7E56CF49-B0B9-A144-8BC8-BD35ED3E29BD}" dt="2025-01-05T02:02:28.825" v="82" actId="12563"/>
+          <pc:sldLayoutMkLst>
+            <pc:docMk/>
+            <pc:sldMasterMk cId="2290278778" sldId="2147483648"/>
+            <pc:sldLayoutMk cId="4192667445" sldId="2147483655"/>
+          </pc:sldLayoutMkLst>
+        </pc:sldLayoutChg>
+        <pc:sldLayoutChg chg="modTransition">
+          <pc:chgData name="Lucas Landy" userId="a13a8088-e36b-49a3-87c4-124f1390f1ca" providerId="ADAL" clId="{7E56CF49-B0B9-A144-8BC8-BD35ED3E29BD}" dt="2025-01-05T02:02:28.825" v="82" actId="12563"/>
+          <pc:sldLayoutMkLst>
+            <pc:docMk/>
+            <pc:sldMasterMk cId="2290278778" sldId="2147483648"/>
+            <pc:sldLayoutMk cId="3974487259" sldId="2147483656"/>
+          </pc:sldLayoutMkLst>
+        </pc:sldLayoutChg>
+        <pc:sldLayoutChg chg="modTransition">
+          <pc:chgData name="Lucas Landy" userId="a13a8088-e36b-49a3-87c4-124f1390f1ca" providerId="ADAL" clId="{7E56CF49-B0B9-A144-8BC8-BD35ED3E29BD}" dt="2025-01-05T02:02:28.825" v="82" actId="12563"/>
+          <pc:sldLayoutMkLst>
+            <pc:docMk/>
+            <pc:sldMasterMk cId="2290278778" sldId="2147483648"/>
+            <pc:sldLayoutMk cId="370740533" sldId="2147483657"/>
+          </pc:sldLayoutMkLst>
+        </pc:sldLayoutChg>
+        <pc:sldLayoutChg chg="modTransition">
+          <pc:chgData name="Lucas Landy" userId="a13a8088-e36b-49a3-87c4-124f1390f1ca" providerId="ADAL" clId="{7E56CF49-B0B9-A144-8BC8-BD35ED3E29BD}" dt="2025-01-05T02:02:28.825" v="82" actId="12563"/>
+          <pc:sldLayoutMkLst>
+            <pc:docMk/>
+            <pc:sldMasterMk cId="2290278778" sldId="2147483648"/>
+            <pc:sldLayoutMk cId="1033135062" sldId="2147483658"/>
+          </pc:sldLayoutMkLst>
+        </pc:sldLayoutChg>
+        <pc:sldLayoutChg chg="modTransition">
+          <pc:chgData name="Lucas Landy" userId="a13a8088-e36b-49a3-87c4-124f1390f1ca" providerId="ADAL" clId="{7E56CF49-B0B9-A144-8BC8-BD35ED3E29BD}" dt="2025-01-05T02:02:28.825" v="82" actId="12563"/>
+          <pc:sldLayoutMkLst>
+            <pc:docMk/>
+            <pc:sldMasterMk cId="2290278778" sldId="2147483648"/>
+            <pc:sldLayoutMk cId="1222150601" sldId="2147483659"/>
+          </pc:sldLayoutMkLst>
+        </pc:sldLayoutChg>
+      </pc:sldMasterChg>
+    </pc:docChg>
+  </pc:docChgLst>
+</pc:chgInfo>
 </file>
 
 <file path=ppt/slideLayouts/slideLayout1.xml><?xml version="1.0" encoding="utf-8"?>
@@ -254,7 +739,7 @@
           <a:p>
             <a:fld id="{CF04B1C0-464F-4F54-8639-669919E0B4A0}" type="datetimeFigureOut">
               <a:rPr lang="fr-FR" smtClean="0"/>
-              <a:t>13/12/2024</a:t>
+              <a:t>05/01/2025</a:t>
             </a:fld>
             <a:endParaRPr lang="fr-FR"/>
           </a:p>
@@ -308,7 +793,7 @@
           <a:p>
             <a:fld id="{276B55B6-FB1A-4281-87A8-19A85BF2CC1B}" type="slidenum">
               <a:rPr lang="fr-FR" smtClean="0"/>
-              <a:t>‹N°›</a:t>
+              <a:t>‹#›</a:t>
             </a:fld>
             <a:endParaRPr lang="fr-FR"/>
           </a:p>
@@ -324,6 +809,18 @@
   <p:clrMapOvr>
     <a:masterClrMapping/>
   </p:clrMapOvr>
+  <mc:AlternateContent xmlns:mc="http://schemas.openxmlformats.org/markup-compatibility/2006">
+    <mc:Choice xmlns:p159="http://schemas.microsoft.com/office/powerpoint/2015/09/main" Requires="p159">
+      <p:transition xmlns:p14="http://schemas.microsoft.com/office/powerpoint/2010/main" spd="slow" p14:dur="2000">
+        <p159:morph option="byObject"/>
+      </p:transition>
+    </mc:Choice>
+    <mc:Fallback>
+      <p:transition spd="slow">
+        <p:fade/>
+      </p:transition>
+    </mc:Fallback>
+  </mc:AlternateContent>
 </p:sldLayout>
 </file>
 
@@ -452,7 +949,7 @@
           <a:p>
             <a:fld id="{CF04B1C0-464F-4F54-8639-669919E0B4A0}" type="datetimeFigureOut">
               <a:rPr lang="fr-FR" smtClean="0"/>
-              <a:t>13/12/2024</a:t>
+              <a:t>05/01/2025</a:t>
             </a:fld>
             <a:endParaRPr lang="fr-FR"/>
           </a:p>
@@ -506,7 +1003,7 @@
           <a:p>
             <a:fld id="{276B55B6-FB1A-4281-87A8-19A85BF2CC1B}" type="slidenum">
               <a:rPr lang="fr-FR" smtClean="0"/>
-              <a:t>‹N°›</a:t>
+              <a:t>‹#›</a:t>
             </a:fld>
             <a:endParaRPr lang="fr-FR"/>
           </a:p>
@@ -522,6 +1019,18 @@
   <p:clrMapOvr>
     <a:masterClrMapping/>
   </p:clrMapOvr>
+  <mc:AlternateContent xmlns:mc="http://schemas.openxmlformats.org/markup-compatibility/2006">
+    <mc:Choice xmlns:p159="http://schemas.microsoft.com/office/powerpoint/2015/09/main" Requires="p159">
+      <p:transition xmlns:p14="http://schemas.microsoft.com/office/powerpoint/2010/main" spd="slow" p14:dur="2000">
+        <p159:morph option="byObject"/>
+      </p:transition>
+    </mc:Choice>
+    <mc:Fallback>
+      <p:transition spd="slow">
+        <p:fade/>
+      </p:transition>
+    </mc:Fallback>
+  </mc:AlternateContent>
 </p:sldLayout>
 </file>
 
@@ -660,7 +1169,7 @@
           <a:p>
             <a:fld id="{CF04B1C0-464F-4F54-8639-669919E0B4A0}" type="datetimeFigureOut">
               <a:rPr lang="fr-FR" smtClean="0"/>
-              <a:t>13/12/2024</a:t>
+              <a:t>05/01/2025</a:t>
             </a:fld>
             <a:endParaRPr lang="fr-FR"/>
           </a:p>
@@ -714,7 +1223,7 @@
           <a:p>
             <a:fld id="{276B55B6-FB1A-4281-87A8-19A85BF2CC1B}" type="slidenum">
               <a:rPr lang="fr-FR" smtClean="0"/>
-              <a:t>‹N°›</a:t>
+              <a:t>‹#›</a:t>
             </a:fld>
             <a:endParaRPr lang="fr-FR"/>
           </a:p>
@@ -730,6 +1239,18 @@
   <p:clrMapOvr>
     <a:masterClrMapping/>
   </p:clrMapOvr>
+  <mc:AlternateContent xmlns:mc="http://schemas.openxmlformats.org/markup-compatibility/2006">
+    <mc:Choice xmlns:p159="http://schemas.microsoft.com/office/powerpoint/2015/09/main" Requires="p159">
+      <p:transition xmlns:p14="http://schemas.microsoft.com/office/powerpoint/2010/main" spd="slow" p14:dur="2000">
+        <p159:morph option="byObject"/>
+      </p:transition>
+    </mc:Choice>
+    <mc:Fallback>
+      <p:transition spd="slow">
+        <p:fade/>
+      </p:transition>
+    </mc:Fallback>
+  </mc:AlternateContent>
 </p:sldLayout>
 </file>
 
@@ -858,7 +1379,7 @@
           <a:p>
             <a:fld id="{CF04B1C0-464F-4F54-8639-669919E0B4A0}" type="datetimeFigureOut">
               <a:rPr lang="fr-FR" smtClean="0"/>
-              <a:t>13/12/2024</a:t>
+              <a:t>05/01/2025</a:t>
             </a:fld>
             <a:endParaRPr lang="fr-FR"/>
           </a:p>
@@ -912,7 +1433,7 @@
           <a:p>
             <a:fld id="{276B55B6-FB1A-4281-87A8-19A85BF2CC1B}" type="slidenum">
               <a:rPr lang="fr-FR" smtClean="0"/>
-              <a:t>‹N°›</a:t>
+              <a:t>‹#›</a:t>
             </a:fld>
             <a:endParaRPr lang="fr-FR"/>
           </a:p>
@@ -928,6 +1449,18 @@
   <p:clrMapOvr>
     <a:masterClrMapping/>
   </p:clrMapOvr>
+  <mc:AlternateContent xmlns:mc="http://schemas.openxmlformats.org/markup-compatibility/2006">
+    <mc:Choice xmlns:p159="http://schemas.microsoft.com/office/powerpoint/2015/09/main" Requires="p159">
+      <p:transition xmlns:p14="http://schemas.microsoft.com/office/powerpoint/2010/main" spd="slow" p14:dur="2000">
+        <p159:morph option="byObject"/>
+      </p:transition>
+    </mc:Choice>
+    <mc:Fallback>
+      <p:transition spd="slow">
+        <p:fade/>
+      </p:transition>
+    </mc:Fallback>
+  </mc:AlternateContent>
 </p:sldLayout>
 </file>
 
@@ -1133,7 +1666,7 @@
           <a:p>
             <a:fld id="{CF04B1C0-464F-4F54-8639-669919E0B4A0}" type="datetimeFigureOut">
               <a:rPr lang="fr-FR" smtClean="0"/>
-              <a:t>13/12/2024</a:t>
+              <a:t>05/01/2025</a:t>
             </a:fld>
             <a:endParaRPr lang="fr-FR"/>
           </a:p>
@@ -1187,7 +1720,7 @@
           <a:p>
             <a:fld id="{276B55B6-FB1A-4281-87A8-19A85BF2CC1B}" type="slidenum">
               <a:rPr lang="fr-FR" smtClean="0"/>
-              <a:t>‹N°›</a:t>
+              <a:t>‹#›</a:t>
             </a:fld>
             <a:endParaRPr lang="fr-FR"/>
           </a:p>
@@ -1203,6 +1736,18 @@
   <p:clrMapOvr>
     <a:masterClrMapping/>
   </p:clrMapOvr>
+  <mc:AlternateContent xmlns:mc="http://schemas.openxmlformats.org/markup-compatibility/2006">
+    <mc:Choice xmlns:p159="http://schemas.microsoft.com/office/powerpoint/2015/09/main" Requires="p159">
+      <p:transition xmlns:p14="http://schemas.microsoft.com/office/powerpoint/2010/main" spd="slow" p14:dur="2000">
+        <p159:morph option="byObject"/>
+      </p:transition>
+    </mc:Choice>
+    <mc:Fallback>
+      <p:transition spd="slow">
+        <p:fade/>
+      </p:transition>
+    </mc:Fallback>
+  </mc:AlternateContent>
 </p:sldLayout>
 </file>
 
@@ -1398,7 +1943,7 @@
           <a:p>
             <a:fld id="{CF04B1C0-464F-4F54-8639-669919E0B4A0}" type="datetimeFigureOut">
               <a:rPr lang="fr-FR" smtClean="0"/>
-              <a:t>13/12/2024</a:t>
+              <a:t>05/01/2025</a:t>
             </a:fld>
             <a:endParaRPr lang="fr-FR"/>
           </a:p>
@@ -1452,7 +1997,7 @@
           <a:p>
             <a:fld id="{276B55B6-FB1A-4281-87A8-19A85BF2CC1B}" type="slidenum">
               <a:rPr lang="fr-FR" smtClean="0"/>
-              <a:t>‹N°›</a:t>
+              <a:t>‹#›</a:t>
             </a:fld>
             <a:endParaRPr lang="fr-FR"/>
           </a:p>
@@ -1468,6 +2013,18 @@
   <p:clrMapOvr>
     <a:masterClrMapping/>
   </p:clrMapOvr>
+  <mc:AlternateContent xmlns:mc="http://schemas.openxmlformats.org/markup-compatibility/2006">
+    <mc:Choice xmlns:p159="http://schemas.microsoft.com/office/powerpoint/2015/09/main" Requires="p159">
+      <p:transition xmlns:p14="http://schemas.microsoft.com/office/powerpoint/2010/main" spd="slow" p14:dur="2000">
+        <p159:morph option="byObject"/>
+      </p:transition>
+    </mc:Choice>
+    <mc:Fallback>
+      <p:transition spd="slow">
+        <p:fade/>
+      </p:transition>
+    </mc:Fallback>
+  </mc:AlternateContent>
 </p:sldLayout>
 </file>
 
@@ -1810,7 +2367,7 @@
           <a:p>
             <a:fld id="{CF04B1C0-464F-4F54-8639-669919E0B4A0}" type="datetimeFigureOut">
               <a:rPr lang="fr-FR" smtClean="0"/>
-              <a:t>13/12/2024</a:t>
+              <a:t>05/01/2025</a:t>
             </a:fld>
             <a:endParaRPr lang="fr-FR"/>
           </a:p>
@@ -1864,7 +2421,7 @@
           <a:p>
             <a:fld id="{276B55B6-FB1A-4281-87A8-19A85BF2CC1B}" type="slidenum">
               <a:rPr lang="fr-FR" smtClean="0"/>
-              <a:t>‹N°›</a:t>
+              <a:t>‹#›</a:t>
             </a:fld>
             <a:endParaRPr lang="fr-FR"/>
           </a:p>
@@ -1880,6 +2437,18 @@
   <p:clrMapOvr>
     <a:masterClrMapping/>
   </p:clrMapOvr>
+  <mc:AlternateContent xmlns:mc="http://schemas.openxmlformats.org/markup-compatibility/2006">
+    <mc:Choice xmlns:p159="http://schemas.microsoft.com/office/powerpoint/2015/09/main" Requires="p159">
+      <p:transition xmlns:p14="http://schemas.microsoft.com/office/powerpoint/2010/main" spd="slow" p14:dur="2000">
+        <p159:morph option="byObject"/>
+      </p:transition>
+    </mc:Choice>
+    <mc:Fallback>
+      <p:transition spd="slow">
+        <p:fade/>
+      </p:transition>
+    </mc:Fallback>
+  </mc:AlternateContent>
 </p:sldLayout>
 </file>
 
@@ -1951,7 +2520,7 @@
           <a:p>
             <a:fld id="{CF04B1C0-464F-4F54-8639-669919E0B4A0}" type="datetimeFigureOut">
               <a:rPr lang="fr-FR" smtClean="0"/>
-              <a:t>13/12/2024</a:t>
+              <a:t>05/01/2025</a:t>
             </a:fld>
             <a:endParaRPr lang="fr-FR"/>
           </a:p>
@@ -2005,7 +2574,7 @@
           <a:p>
             <a:fld id="{276B55B6-FB1A-4281-87A8-19A85BF2CC1B}" type="slidenum">
               <a:rPr lang="fr-FR" smtClean="0"/>
-              <a:t>‹N°›</a:t>
+              <a:t>‹#›</a:t>
             </a:fld>
             <a:endParaRPr lang="fr-FR"/>
           </a:p>
@@ -2021,6 +2590,18 @@
   <p:clrMapOvr>
     <a:masterClrMapping/>
   </p:clrMapOvr>
+  <mc:AlternateContent xmlns:mc="http://schemas.openxmlformats.org/markup-compatibility/2006">
+    <mc:Choice xmlns:p159="http://schemas.microsoft.com/office/powerpoint/2015/09/main" Requires="p159">
+      <p:transition xmlns:p14="http://schemas.microsoft.com/office/powerpoint/2010/main" spd="slow" p14:dur="2000">
+        <p159:morph option="byObject"/>
+      </p:transition>
+    </mc:Choice>
+    <mc:Fallback>
+      <p:transition spd="slow">
+        <p:fade/>
+      </p:transition>
+    </mc:Fallback>
+  </mc:AlternateContent>
 </p:sldLayout>
 </file>
 
@@ -2064,7 +2645,7 @@
           <a:p>
             <a:fld id="{CF04B1C0-464F-4F54-8639-669919E0B4A0}" type="datetimeFigureOut">
               <a:rPr lang="fr-FR" smtClean="0"/>
-              <a:t>13/12/2024</a:t>
+              <a:t>05/01/2025</a:t>
             </a:fld>
             <a:endParaRPr lang="fr-FR"/>
           </a:p>
@@ -2118,7 +2699,7 @@
           <a:p>
             <a:fld id="{276B55B6-FB1A-4281-87A8-19A85BF2CC1B}" type="slidenum">
               <a:rPr lang="fr-FR" smtClean="0"/>
-              <a:t>‹N°›</a:t>
+              <a:t>‹#›</a:t>
             </a:fld>
             <a:endParaRPr lang="fr-FR"/>
           </a:p>
@@ -2134,6 +2715,18 @@
   <p:clrMapOvr>
     <a:masterClrMapping/>
   </p:clrMapOvr>
+  <mc:AlternateContent xmlns:mc="http://schemas.openxmlformats.org/markup-compatibility/2006">
+    <mc:Choice xmlns:p159="http://schemas.microsoft.com/office/powerpoint/2015/09/main" Requires="p159">
+      <p:transition xmlns:p14="http://schemas.microsoft.com/office/powerpoint/2010/main" spd="slow" p14:dur="2000">
+        <p159:morph option="byObject"/>
+      </p:transition>
+    </mc:Choice>
+    <mc:Fallback>
+      <p:transition spd="slow">
+        <p:fade/>
+      </p:transition>
+    </mc:Fallback>
+  </mc:AlternateContent>
 </p:sldLayout>
 </file>
 
@@ -2375,7 +2968,7 @@
           <a:p>
             <a:fld id="{CF04B1C0-464F-4F54-8639-669919E0B4A0}" type="datetimeFigureOut">
               <a:rPr lang="fr-FR" smtClean="0"/>
-              <a:t>13/12/2024</a:t>
+              <a:t>05/01/2025</a:t>
             </a:fld>
             <a:endParaRPr lang="fr-FR"/>
           </a:p>
@@ -2429,7 +3022,7 @@
           <a:p>
             <a:fld id="{276B55B6-FB1A-4281-87A8-19A85BF2CC1B}" type="slidenum">
               <a:rPr lang="fr-FR" smtClean="0"/>
-              <a:t>‹N°›</a:t>
+              <a:t>‹#›</a:t>
             </a:fld>
             <a:endParaRPr lang="fr-FR"/>
           </a:p>
@@ -2445,6 +3038,18 @@
   <p:clrMapOvr>
     <a:masterClrMapping/>
   </p:clrMapOvr>
+  <mc:AlternateContent xmlns:mc="http://schemas.openxmlformats.org/markup-compatibility/2006">
+    <mc:Choice xmlns:p159="http://schemas.microsoft.com/office/powerpoint/2015/09/main" Requires="p159">
+      <p:transition xmlns:p14="http://schemas.microsoft.com/office/powerpoint/2010/main" spd="slow" p14:dur="2000">
+        <p159:morph option="byObject"/>
+      </p:transition>
+    </mc:Choice>
+    <mc:Fallback>
+      <p:transition spd="slow">
+        <p:fade/>
+      </p:transition>
+    </mc:Fallback>
+  </mc:AlternateContent>
 </p:sldLayout>
 </file>
 
@@ -2663,7 +3268,7 @@
           <a:p>
             <a:fld id="{CF04B1C0-464F-4F54-8639-669919E0B4A0}" type="datetimeFigureOut">
               <a:rPr lang="fr-FR" smtClean="0"/>
-              <a:t>13/12/2024</a:t>
+              <a:t>05/01/2025</a:t>
             </a:fld>
             <a:endParaRPr lang="fr-FR"/>
           </a:p>
@@ -2717,7 +3322,7 @@
           <a:p>
             <a:fld id="{276B55B6-FB1A-4281-87A8-19A85BF2CC1B}" type="slidenum">
               <a:rPr lang="fr-FR" smtClean="0"/>
-              <a:t>‹N°›</a:t>
+              <a:t>‹#›</a:t>
             </a:fld>
             <a:endParaRPr lang="fr-FR"/>
           </a:p>
@@ -2733,6 +3338,18 @@
   <p:clrMapOvr>
     <a:masterClrMapping/>
   </p:clrMapOvr>
+  <mc:AlternateContent xmlns:mc="http://schemas.openxmlformats.org/markup-compatibility/2006">
+    <mc:Choice xmlns:p159="http://schemas.microsoft.com/office/powerpoint/2015/09/main" Requires="p159">
+      <p:transition xmlns:p14="http://schemas.microsoft.com/office/powerpoint/2010/main" spd="slow" p14:dur="2000">
+        <p159:morph option="byObject"/>
+      </p:transition>
+    </mc:Choice>
+    <mc:Fallback>
+      <p:transition spd="slow">
+        <p:fade/>
+      </p:transition>
+    </mc:Fallback>
+  </mc:AlternateContent>
 </p:sldLayout>
 </file>
 
@@ -2904,7 +3521,7 @@
           <a:p>
             <a:fld id="{CF04B1C0-464F-4F54-8639-669919E0B4A0}" type="datetimeFigureOut">
               <a:rPr lang="fr-FR" smtClean="0"/>
-              <a:t>13/12/2024</a:t>
+              <a:t>05/01/2025</a:t>
             </a:fld>
             <a:endParaRPr lang="fr-FR"/>
           </a:p>
@@ -2994,7 +3611,7 @@
           <a:p>
             <a:fld id="{276B55B6-FB1A-4281-87A8-19A85BF2CC1B}" type="slidenum">
               <a:rPr lang="fr-FR" smtClean="0"/>
-              <a:t>‹N°›</a:t>
+              <a:t>‹#›</a:t>
             </a:fld>
             <a:endParaRPr lang="fr-FR"/>
           </a:p>
@@ -3021,6 +3638,18 @@
     <p:sldLayoutId id="2147483658" r:id="rId10"/>
     <p:sldLayoutId id="2147483659" r:id="rId11"/>
   </p:sldLayoutIdLst>
+  <mc:AlternateContent xmlns:mc="http://schemas.openxmlformats.org/markup-compatibility/2006">
+    <mc:Choice xmlns:p159="http://schemas.microsoft.com/office/powerpoint/2015/09/main" Requires="p159">
+      <p:transition xmlns:p14="http://schemas.microsoft.com/office/powerpoint/2010/main" spd="slow" p14:dur="2000">
+        <p159:morph option="byObject"/>
+      </p:transition>
+    </mc:Choice>
+    <mc:Fallback>
+      <p:transition spd="slow">
+        <p:fade/>
+      </p:transition>
+    </mc:Fallback>
+  </mc:AlternateContent>
   <p:txStyles>
     <p:titleStyle>
       <a:lvl1pPr algn="l" defTabSz="914400" rtl="0" eaLnBrk="1" latinLnBrk="0" hangingPunct="1">
@@ -3321,6 +3950,66 @@
           <a:chExt cx="0" cy="0"/>
         </a:xfrm>
       </p:grpSpPr>
+      <p:sp useBgFill="1">
+        <p:nvSpPr>
+          <p:cNvPr id="19" name="Rectangle 18">
+            <a:extLst>
+              <a:ext uri="{FF2B5EF4-FFF2-40B4-BE49-F238E27FC236}">
+                <a16:creationId xmlns:a16="http://schemas.microsoft.com/office/drawing/2014/main" id="{932495F0-C5CB-4823-AE70-EED61EBAB1BD}"/>
+              </a:ext>
+              <a:ext uri="{C183D7F6-B498-43B3-948B-1728B52AA6E4}">
+                <adec:decorative xmlns:adec="http://schemas.microsoft.com/office/drawing/2017/decorative" val="1"/>
+              </a:ext>
+            </a:extLst>
+          </p:cNvPr>
+          <p:cNvSpPr>
+            <a:spLocks noGrp="1" noRot="1" noChangeAspect="1" noMove="1" noResize="1" noEditPoints="1" noAdjustHandles="1" noChangeArrowheads="1" noChangeShapeType="1" noTextEdit="1"/>
+          </p:cNvSpPr>
+          <p:nvPr>
+            <p:extLst>
+              <p:ext uri="{386F3935-93C4-4BCD-93E2-E3B085C9AB24}">
+                <p16:designElem xmlns:p16="http://schemas.microsoft.com/office/powerpoint/2015/main" val="1"/>
+              </p:ext>
+            </p:extLst>
+          </p:nvPr>
+        </p:nvSpPr>
+        <p:spPr>
+          <a:xfrm>
+            <a:off x="0" y="0"/>
+            <a:ext cx="12192000" cy="6858000"/>
+          </a:xfrm>
+          <a:prstGeom prst="rect">
+            <a:avLst/>
+          </a:prstGeom>
+          <a:ln>
+            <a:noFill/>
+          </a:ln>
+        </p:spPr>
+        <p:style>
+          <a:lnRef idx="2">
+            <a:schemeClr val="accent1">
+              <a:shade val="50000"/>
+            </a:schemeClr>
+          </a:lnRef>
+          <a:fillRef idx="1">
+            <a:schemeClr val="accent1"/>
+          </a:fillRef>
+          <a:effectRef idx="0">
+            <a:schemeClr val="accent1"/>
+          </a:effectRef>
+          <a:fontRef idx="minor">
+            <a:schemeClr val="lt1"/>
+          </a:fontRef>
+        </p:style>
+        <p:txBody>
+          <a:bodyPr rtlCol="0" anchor="ctr"/>
+          <a:lstStyle/>
+          <a:p>
+            <a:pPr algn="ctr"/>
+            <a:endParaRPr lang="en-US"/>
+          </a:p>
+        </p:txBody>
+      </p:sp>
       <p:sp>
         <p:nvSpPr>
           <p:cNvPr id="2" name="Titre 1">
@@ -3337,40 +4026,315 @@
             <p:ph type="ctrTitle"/>
           </p:nvPr>
         </p:nvSpPr>
-        <p:spPr/>
-        <p:txBody>
-          <a:bodyPr/>
-          <a:lstStyle/>
-          <a:p>
-            <a:endParaRPr lang="fr-FR"/>
-          </a:p>
-        </p:txBody>
-      </p:sp>
-      <p:sp>
-        <p:nvSpPr>
-          <p:cNvPr id="3" name="Sous-titre 2">
-            <a:extLst>
-              <a:ext uri="{FF2B5EF4-FFF2-40B4-BE49-F238E27FC236}">
-                <a16:creationId xmlns:a16="http://schemas.microsoft.com/office/drawing/2014/main" id="{BE180B9B-8F46-76FE-8971-06A4968BE049}"/>
-              </a:ext>
-            </a:extLst>
-          </p:cNvPr>
-          <p:cNvSpPr>
-            <a:spLocks noGrp="1"/>
-          </p:cNvSpPr>
-          <p:nvPr>
-            <p:ph type="subTitle" idx="1"/>
-          </p:nvPr>
-        </p:nvSpPr>
-        <p:spPr/>
-        <p:txBody>
-          <a:bodyPr/>
-          <a:lstStyle/>
-          <a:p>
-            <a:endParaRPr lang="fr-FR"/>
-          </a:p>
-        </p:txBody>
-      </p:sp>
+        <p:spPr>
+          <a:xfrm>
+            <a:off x="880528" y="1097280"/>
+            <a:ext cx="4846320" cy="2898648"/>
+          </a:xfrm>
+          <a:noFill/>
+        </p:spPr>
+        <p:txBody>
+          <a:bodyPr anchor="t">
+            <a:normAutofit fontScale="90000"/>
+          </a:bodyPr>
+          <a:lstStyle/>
+          <a:p>
+            <a:pPr algn="l"/>
+            <a:r>
+              <a:rPr lang="fr-FR" sz="7200" b="1" dirty="0"/>
+              <a:t>COLABS</a:t>
+            </a:r>
+            <a:br>
+              <a:rPr lang="fr-FR" sz="7200" b="1" dirty="0"/>
+            </a:br>
+            <a:r>
+              <a:rPr lang="fr-FR" sz="4900" dirty="0"/>
+              <a:t>MRI </a:t>
+            </a:r>
+            <a:r>
+              <a:rPr lang="fr-FR" sz="4900" dirty="0" err="1"/>
+              <a:t>tumor</a:t>
+            </a:r>
+            <a:r>
+              <a:rPr lang="fr-FR" sz="4900" dirty="0"/>
+              <a:t> </a:t>
+            </a:r>
+            <a:r>
+              <a:rPr lang="fr-FR" sz="4900" dirty="0" err="1"/>
+              <a:t>detection</a:t>
+            </a:r>
+            <a:r>
+              <a:rPr lang="fr-FR" sz="4900" dirty="0"/>
+              <a:t> </a:t>
+            </a:r>
+            <a:r>
+              <a:rPr lang="fr-FR" sz="4900" dirty="0" err="1"/>
+              <a:t>using</a:t>
+            </a:r>
+            <a:r>
+              <a:rPr lang="fr-FR" sz="4900" dirty="0"/>
+              <a:t> CNN</a:t>
+            </a:r>
+          </a:p>
+        </p:txBody>
+      </p:sp>
+      <p:sp>
+        <p:nvSpPr>
+          <p:cNvPr id="21" name="Rectangle 20">
+            <a:extLst>
+              <a:ext uri="{FF2B5EF4-FFF2-40B4-BE49-F238E27FC236}">
+                <a16:creationId xmlns:a16="http://schemas.microsoft.com/office/drawing/2014/main" id="{CB8B9C25-D80D-48EC-B83A-231219A80C3F}"/>
+              </a:ext>
+              <a:ext uri="{C183D7F6-B498-43B3-948B-1728B52AA6E4}">
+                <adec:decorative xmlns:adec="http://schemas.microsoft.com/office/drawing/2017/decorative" val="1"/>
+              </a:ext>
+            </a:extLst>
+          </p:cNvPr>
+          <p:cNvSpPr>
+            <a:spLocks noGrp="1" noRot="1" noChangeAspect="1" noMove="1" noResize="1" noEditPoints="1" noAdjustHandles="1" noChangeArrowheads="1" noChangeShapeType="1" noTextEdit="1"/>
+          </p:cNvSpPr>
+          <p:nvPr>
+            <p:extLst>
+              <p:ext uri="{386F3935-93C4-4BCD-93E2-E3B085C9AB24}">
+                <p16:designElem xmlns:p16="http://schemas.microsoft.com/office/powerpoint/2015/main" val="1"/>
+              </p:ext>
+            </p:extLst>
+          </p:nvPr>
+        </p:nvSpPr>
+        <p:spPr>
+          <a:xfrm rot="5400000">
+            <a:off x="1182975" y="346791"/>
+            <a:ext cx="146304" cy="704088"/>
+          </a:xfrm>
+          <a:prstGeom prst="rect">
+            <a:avLst/>
+          </a:prstGeom>
+          <a:solidFill>
+            <a:schemeClr val="accent2"/>
+          </a:solidFill>
+          <a:ln>
+            <a:noFill/>
+          </a:ln>
+        </p:spPr>
+        <p:style>
+          <a:lnRef idx="2">
+            <a:schemeClr val="accent1">
+              <a:shade val="50000"/>
+            </a:schemeClr>
+          </a:lnRef>
+          <a:fillRef idx="1">
+            <a:schemeClr val="accent1"/>
+          </a:fillRef>
+          <a:effectRef idx="0">
+            <a:schemeClr val="accent1"/>
+          </a:effectRef>
+          <a:fontRef idx="minor">
+            <a:schemeClr val="lt1"/>
+          </a:fontRef>
+        </p:style>
+        <p:txBody>
+          <a:bodyPr rtlCol="0" anchor="ctr"/>
+          <a:lstStyle/>
+          <a:p>
+            <a:pPr algn="ctr"/>
+            <a:endParaRPr lang="en-US">
+              <a:solidFill>
+                <a:prstClr val="white"/>
+              </a:solidFill>
+              <a:latin typeface="Calibri" panose="020F0502020204030204"/>
+            </a:endParaRPr>
+          </a:p>
+        </p:txBody>
+      </p:sp>
+      <p:pic>
+        <p:nvPicPr>
+          <p:cNvPr id="9" name="Picture 8">
+            <a:extLst>
+              <a:ext uri="{FF2B5EF4-FFF2-40B4-BE49-F238E27FC236}">
+                <a16:creationId xmlns:a16="http://schemas.microsoft.com/office/drawing/2014/main" id="{ADC8AD5B-F637-A865-9ECA-B63CAB8B899D}"/>
+              </a:ext>
+            </a:extLst>
+          </p:cNvPr>
+          <p:cNvPicPr>
+            <a:picLocks noChangeAspect="1"/>
+          </p:cNvPicPr>
+          <p:nvPr/>
+        </p:nvPicPr>
+        <p:blipFill>
+          <a:blip r:embed="rId2"/>
+          <a:stretch>
+            <a:fillRect/>
+          </a:stretch>
+        </p:blipFill>
+        <p:spPr>
+          <a:xfrm>
+            <a:off x="1474769" y="5715000"/>
+            <a:ext cx="3875439" cy="871975"/>
+          </a:xfrm>
+          <a:prstGeom prst="rect">
+            <a:avLst/>
+          </a:prstGeom>
+        </p:spPr>
+      </p:pic>
+      <p:sp>
+        <p:nvSpPr>
+          <p:cNvPr id="23" name="Rectangle 22">
+            <a:extLst>
+              <a:ext uri="{FF2B5EF4-FFF2-40B4-BE49-F238E27FC236}">
+                <a16:creationId xmlns:a16="http://schemas.microsoft.com/office/drawing/2014/main" id="{601CC70B-8875-45A1-8AFD-7D546E3C0C16}"/>
+              </a:ext>
+              <a:ext uri="{C183D7F6-B498-43B3-948B-1728B52AA6E4}">
+                <adec:decorative xmlns:adec="http://schemas.microsoft.com/office/drawing/2017/decorative" val="1"/>
+              </a:ext>
+            </a:extLst>
+          </p:cNvPr>
+          <p:cNvSpPr>
+            <a:spLocks noGrp="1" noRot="1" noChangeAspect="1" noMove="1" noResize="1" noEditPoints="1" noAdjustHandles="1" noChangeArrowheads="1" noChangeShapeType="1" noTextEdit="1"/>
+          </p:cNvSpPr>
+          <p:nvPr>
+            <p:extLst>
+              <p:ext uri="{386F3935-93C4-4BCD-93E2-E3B085C9AB24}">
+                <p16:designElem xmlns:p16="http://schemas.microsoft.com/office/powerpoint/2015/main" val="1"/>
+              </p:ext>
+            </p:extLst>
+          </p:nvPr>
+        </p:nvSpPr>
+        <p:spPr>
+          <a:xfrm>
+            <a:off x="853897" y="4177748"/>
+            <a:ext cx="4824407" cy="18288"/>
+          </a:xfrm>
+          <a:prstGeom prst="rect">
+            <a:avLst/>
+          </a:prstGeom>
+          <a:solidFill>
+            <a:srgbClr val="D5D5D5"/>
+          </a:solidFill>
+          <a:ln w="3175">
+            <a:noFill/>
+          </a:ln>
+          <a:effectLst/>
+        </p:spPr>
+        <p:style>
+          <a:lnRef idx="2">
+            <a:schemeClr val="accent1">
+              <a:shade val="50000"/>
+            </a:schemeClr>
+          </a:lnRef>
+          <a:fillRef idx="1">
+            <a:schemeClr val="accent1"/>
+          </a:fillRef>
+          <a:effectRef idx="0">
+            <a:schemeClr val="accent1"/>
+          </a:effectRef>
+          <a:fontRef idx="minor">
+            <a:schemeClr val="lt1"/>
+          </a:fontRef>
+        </p:style>
+        <p:txBody>
+          <a:bodyPr rtlCol="0" anchor="ctr"/>
+          <a:lstStyle/>
+          <a:p>
+            <a:pPr marL="0" marR="0" lvl="0" indent="0" algn="ctr" defTabSz="914400" rtl="0" eaLnBrk="1" fontAlgn="auto" latinLnBrk="0" hangingPunct="1">
+              <a:lnSpc>
+                <a:spcPct val="100000"/>
+              </a:lnSpc>
+              <a:spcBef>
+                <a:spcPts val="0"/>
+              </a:spcBef>
+              <a:spcAft>
+                <a:spcPts val="0"/>
+              </a:spcAft>
+              <a:buClrTx/>
+              <a:buSzTx/>
+              <a:buFontTx/>
+              <a:buNone/>
+              <a:tabLst/>
+              <a:defRPr/>
+            </a:pPr>
+            <a:endParaRPr kumimoji="0" lang="en-US" sz="1800" b="0" i="0" u="none" strike="noStrike" kern="1200" cap="none" spc="0" normalizeH="0" baseline="0" noProof="0">
+              <a:ln>
+                <a:noFill/>
+              </a:ln>
+              <a:solidFill>
+                <a:prstClr val="white"/>
+              </a:solidFill>
+              <a:effectLst/>
+              <a:uLnTx/>
+              <a:uFillTx/>
+              <a:latin typeface="Calibri" panose="020F0502020204030204"/>
+              <a:ea typeface="+mn-ea"/>
+              <a:cs typeface="+mn-cs"/>
+            </a:endParaRPr>
+          </a:p>
+        </p:txBody>
+      </p:sp>
+      <p:pic>
+        <p:nvPicPr>
+          <p:cNvPr id="14" name="Picture 13">
+            <a:extLst>
+              <a:ext uri="{FF2B5EF4-FFF2-40B4-BE49-F238E27FC236}">
+                <a16:creationId xmlns:a16="http://schemas.microsoft.com/office/drawing/2014/main" id="{8D2C3CEB-0A06-52BC-40B9-0BAD517DFEE1}"/>
+              </a:ext>
+            </a:extLst>
+          </p:cNvPr>
+          <p:cNvPicPr>
+            <a:picLocks noChangeAspect="1"/>
+          </p:cNvPicPr>
+          <p:nvPr/>
+        </p:nvPicPr>
+        <p:blipFill>
+          <a:blip r:embed="rId3"/>
+          <a:stretch>
+            <a:fillRect/>
+          </a:stretch>
+        </p:blipFill>
+        <p:spPr>
+          <a:xfrm>
+            <a:off x="1474771" y="4332136"/>
+            <a:ext cx="3875440" cy="1288584"/>
+          </a:xfrm>
+          <a:prstGeom prst="rect">
+            <a:avLst/>
+          </a:prstGeom>
+        </p:spPr>
+      </p:pic>
+      <p:pic>
+        <p:nvPicPr>
+          <p:cNvPr id="18" name="Picture 17">
+            <a:extLst>
+              <a:ext uri="{FF2B5EF4-FFF2-40B4-BE49-F238E27FC236}">
+                <a16:creationId xmlns:a16="http://schemas.microsoft.com/office/drawing/2014/main" id="{3FD2F824-8E09-5EEA-F048-03075A56558A}"/>
+              </a:ext>
+            </a:extLst>
+          </p:cNvPr>
+          <p:cNvPicPr>
+            <a:picLocks noChangeAspect="1"/>
+          </p:cNvPicPr>
+          <p:nvPr/>
+        </p:nvPicPr>
+        <p:blipFill>
+          <a:blip r:embed="rId4">
+            <a:extLst>
+              <a:ext uri="{28A0092B-C50C-407E-A947-70E740481C1C}">
+                <a14:useLocalDpi xmlns:a14="http://schemas.microsoft.com/office/drawing/2010/main" val="0"/>
+              </a:ext>
+            </a:extLst>
+          </a:blip>
+          <a:stretch>
+            <a:fillRect/>
+          </a:stretch>
+        </p:blipFill>
+        <p:spPr>
+          <a:xfrm>
+            <a:off x="6444127" y="617394"/>
+            <a:ext cx="5444582" cy="5614923"/>
+          </a:xfrm>
+          <a:prstGeom prst="rect">
+            <a:avLst/>
+          </a:prstGeom>
+        </p:spPr>
+      </p:pic>
     </p:spTree>
     <p:extLst>
       <p:ext uri="{BB962C8B-B14F-4D97-AF65-F5344CB8AC3E}">
@@ -3381,6 +4345,18 @@
   <p:clrMapOvr>
     <a:masterClrMapping/>
   </p:clrMapOvr>
+  <mc:AlternateContent xmlns:mc="http://schemas.openxmlformats.org/markup-compatibility/2006">
+    <mc:Choice xmlns:p159="http://schemas.microsoft.com/office/powerpoint/2015/09/main" Requires="p159">
+      <p:transition xmlns:p14="http://schemas.microsoft.com/office/powerpoint/2010/main" spd="slow" p14:dur="2000">
+        <p159:morph option="byObject"/>
+      </p:transition>
+    </mc:Choice>
+    <mc:Fallback>
+      <p:transition spd="slow">
+        <p:fade/>
+      </p:transition>
+    </mc:Fallback>
+  </mc:AlternateContent>
 </p:sld>
 </file>
 

</xml_diff>